<commit_message>
final updates after webinar
</commit_message>
<xml_diff>
--- a/RSE Webinar - 08.29.2018.pptx
+++ b/RSE Webinar - 08.29.2018.pptx
@@ -264,7 +264,7 @@
           <a:p>
             <a:fld id="{D73FC156-C9C5-F148-A42F-53C36D0CD7AB}" type="datetimeFigureOut">
               <a:rPr lang="en-US" smtClean="0"/>
-              <a:t>8/28/2018</a:t>
+              <a:t>8/29/2018</a:t>
             </a:fld>
             <a:endParaRPr lang="en-US" dirty="0"/>
           </a:p>
@@ -991,7 +991,27 @@
           <a:p>
             <a:r>
               <a:rPr lang="en-US" baseline="0" dirty="0" smtClean="0"/>
-              <a:t>It doesn’t need to have meaningful names, functions, classes, objects, variables. It just needs some instructions. Languages are for us!</a:t>
+              <a:t>It doesn’t need to have meaningful names, functions, classes, objects, variables. It just needs some </a:t>
+            </a:r>
+            <a:r>
+              <a:rPr lang="en-US" baseline="0" dirty="0" smtClean="0"/>
+              <a:t>instructions.</a:t>
+            </a:r>
+          </a:p>
+          <a:p>
+            <a:r>
+              <a:rPr lang="en-US" baseline="0" dirty="0" smtClean="0"/>
+              <a:t>[CLICK]</a:t>
+            </a:r>
+          </a:p>
+          <a:p>
+            <a:r>
+              <a:rPr lang="en-US" baseline="0" dirty="0" smtClean="0"/>
+              <a:t>Languages </a:t>
+            </a:r>
+            <a:r>
+              <a:rPr lang="en-US" baseline="0" dirty="0" smtClean="0"/>
+              <a:t>are for us!</a:t>
             </a:r>
             <a:endParaRPr lang="en-US" dirty="0"/>
           </a:p>
@@ -1543,36 +1563,12 @@
           <a:p>
             <a:r>
               <a:rPr lang="en-US" dirty="0" smtClean="0"/>
-              <a:t>Basically, we get the properties that all the dogs have and define a </a:t>
-            </a:r>
-            <a:r>
-              <a:rPr lang="en-US" dirty="0" smtClean="0">
-                <a:solidFill>
-                  <a:srgbClr val="FF0000"/>
-                </a:solidFill>
-              </a:rPr>
-              <a:t>Dog</a:t>
-            </a:r>
-            <a:r>
-              <a:rPr lang="en-US" dirty="0" smtClean="0"/>
-              <a:t> class with them.</a:t>
-            </a:r>
-          </a:p>
-          <a:p>
-            <a:pPr lvl="1"/>
-            <a:r>
-              <a:rPr lang="en-US" dirty="0" smtClean="0"/>
-              <a:t>A class is a generalization of objects.</a:t>
-            </a:r>
-          </a:p>
-          <a:p>
-            <a:pPr lvl="1"/>
-            <a:r>
-              <a:rPr lang="en-US" dirty="0" smtClean="0"/>
-              <a:t>And objects are just instances of the class.</a:t>
-            </a:r>
-          </a:p>
-          <a:p>
+              <a:t>If we solve a problem based on</a:t>
+            </a:r>
+            <a:r>
+              <a:rPr lang="en-US" baseline="0" dirty="0" smtClean="0"/>
+              <a:t> mostly these. Then definitely.</a:t>
+            </a:r>
             <a:endParaRPr lang="en-US" dirty="0"/>
           </a:p>
         </p:txBody>
@@ -1594,16 +1590,16 @@
           <a:p>
             <a:fld id="{D73FF19C-8393-2A49-92A3-90AE761DDBC5}" type="slidenum">
               <a:rPr lang="en-US" smtClean="0"/>
-              <a:t>24</a:t>
+              <a:t>18</a:t>
             </a:fld>
-            <a:endParaRPr lang="en-US"/>
+            <a:endParaRPr lang="en-US" dirty="0"/>
           </a:p>
         </p:txBody>
       </p:sp>
     </p:spTree>
     <p:extLst>
       <p:ext uri="{BB962C8B-B14F-4D97-AF65-F5344CB8AC3E}">
-        <p14:creationId xmlns:p14="http://schemas.microsoft.com/office/powerpoint/2010/main" val="416629319"/>
+        <p14:creationId xmlns:p14="http://schemas.microsoft.com/office/powerpoint/2010/main" val="324726382"/>
       </p:ext>
     </p:extLst>
   </p:cSld>
@@ -1659,29 +1655,7 @@
           <a:p>
             <a:r>
               <a:rPr lang="en-US" dirty="0" smtClean="0"/>
-              <a:t>You remember we had this code piece that’s has lots of duplicates.</a:t>
-            </a:r>
-          </a:p>
-          <a:p>
-            <a:endParaRPr lang="en-US" dirty="0" smtClean="0"/>
-          </a:p>
-          <a:p>
-            <a:r>
-              <a:rPr lang="en-US" dirty="0" smtClean="0"/>
-              <a:t>Let’s see if</a:t>
-            </a:r>
-            <a:r>
-              <a:rPr lang="en-US" baseline="0" dirty="0" smtClean="0"/>
-              <a:t> how it will look like after OOD is applied. [CLICK]</a:t>
-            </a:r>
-          </a:p>
-          <a:p>
-            <a:endParaRPr lang="en-US" baseline="0" dirty="0" smtClean="0"/>
-          </a:p>
-          <a:p>
-            <a:r>
-              <a:rPr lang="en-US" baseline="0" dirty="0" smtClean="0"/>
-              <a:t>And this is how they are created as an object. Remember creating objects from classes. [CLICK]</a:t>
+              <a:t>And this is what brings us to UML</a:t>
             </a:r>
             <a:endParaRPr lang="en-US" dirty="0"/>
           </a:p>
@@ -1704,16 +1678,16 @@
           <a:p>
             <a:fld id="{D73FF19C-8393-2A49-92A3-90AE761DDBC5}" type="slidenum">
               <a:rPr lang="en-US" smtClean="0"/>
-              <a:t>26</a:t>
+              <a:t>20</a:t>
             </a:fld>
-            <a:endParaRPr lang="en-US"/>
+            <a:endParaRPr lang="en-US" dirty="0"/>
           </a:p>
         </p:txBody>
       </p:sp>
     </p:spTree>
     <p:extLst>
       <p:ext uri="{BB962C8B-B14F-4D97-AF65-F5344CB8AC3E}">
-        <p14:creationId xmlns:p14="http://schemas.microsoft.com/office/powerpoint/2010/main" val="1389575709"/>
+        <p14:creationId xmlns:p14="http://schemas.microsoft.com/office/powerpoint/2010/main" val="1706684034"/>
       </p:ext>
     </p:extLst>
   </p:cSld>
@@ -1767,105 +1741,14 @@
           <a:bodyPr/>
           <a:lstStyle/>
           <a:p>
-            <a:pPr marL="0" marR="0" lvl="0" indent="0" algn="l" defTabSz="457200" rtl="0" eaLnBrk="1" fontAlgn="auto" latinLnBrk="0" hangingPunct="1">
-              <a:lnSpc>
-                <a:spcPct val="100000"/>
-              </a:lnSpc>
-              <a:spcBef>
-                <a:spcPts val="0"/>
-              </a:spcBef>
-              <a:spcAft>
-                <a:spcPts val="0"/>
-              </a:spcAft>
-              <a:buClrTx/>
-              <a:buSzTx/>
-              <a:buFontTx/>
-              <a:buNone/>
-              <a:tabLst/>
-              <a:defRPr/>
-            </a:pPr>
-            <a:r>
-              <a:rPr lang="en-US" sz="1200" dirty="0" smtClean="0">
-                <a:solidFill>
-                  <a:srgbClr val="FF0000"/>
-                </a:solidFill>
-              </a:rPr>
-              <a:t>Of course, no</a:t>
-            </a:r>
-            <a:r>
-              <a:rPr lang="en-US" sz="1200" baseline="0" dirty="0" smtClean="0">
-                <a:solidFill>
-                  <a:srgbClr val="FF0000"/>
-                </a:solidFill>
-              </a:rPr>
-              <a:t> fancy approach is without its consequences. OOD has lots of principles and concepts.</a:t>
-            </a:r>
-            <a:endParaRPr lang="en-US" sz="1200" dirty="0" smtClean="0">
-              <a:solidFill>
-                <a:srgbClr val="FF0000"/>
-              </a:solidFill>
-            </a:endParaRPr>
-          </a:p>
-          <a:p>
-            <a:pPr marL="0" marR="0" lvl="0" indent="0" algn="l" defTabSz="457200" rtl="0" eaLnBrk="1" fontAlgn="auto" latinLnBrk="0" hangingPunct="1">
-              <a:lnSpc>
-                <a:spcPct val="100000"/>
-              </a:lnSpc>
-              <a:spcBef>
-                <a:spcPts val="0"/>
-              </a:spcBef>
-              <a:spcAft>
-                <a:spcPts val="0"/>
-              </a:spcAft>
-              <a:buClrTx/>
-              <a:buSzTx/>
-              <a:buFontTx/>
-              <a:buNone/>
-              <a:tabLst/>
-              <a:defRPr/>
-            </a:pPr>
-            <a:endParaRPr lang="en-US" sz="1200" dirty="0" smtClean="0">
-              <a:solidFill>
-                <a:srgbClr val="FF0000"/>
-              </a:solidFill>
-            </a:endParaRPr>
-          </a:p>
-          <a:p>
-            <a:pPr marL="0" marR="0" lvl="0" indent="0" algn="l" defTabSz="457200" rtl="0" eaLnBrk="1" fontAlgn="auto" latinLnBrk="0" hangingPunct="1">
-              <a:lnSpc>
-                <a:spcPct val="100000"/>
-              </a:lnSpc>
-              <a:spcBef>
-                <a:spcPts val="0"/>
-              </a:spcBef>
-              <a:spcAft>
-                <a:spcPts val="0"/>
-              </a:spcAft>
-              <a:buClrTx/>
-              <a:buSzTx/>
-              <a:buFontTx/>
-              <a:buNone/>
-              <a:tabLst/>
-              <a:defRPr/>
-            </a:pPr>
-            <a:r>
-              <a:rPr lang="en-US" sz="1200" dirty="0" smtClean="0">
-                <a:solidFill>
-                  <a:srgbClr val="FF0000"/>
-                </a:solidFill>
-              </a:rPr>
-              <a:t>If </a:t>
-            </a:r>
-            <a:r>
-              <a:rPr lang="en-US" sz="1200" dirty="0" smtClean="0">
-                <a:solidFill>
-                  <a:srgbClr val="FF0000"/>
-                </a:solidFill>
-              </a:rPr>
-              <a:t>we don’t use these concepts and obey these principles, we aren’t coding in proper object-oriented way.</a:t>
-            </a:r>
-          </a:p>
-          <a:p>
+            <a:r>
+              <a:rPr lang="en-US" dirty="0" smtClean="0"/>
+              <a:t>So it is basically a set of diagrams in order to be at the same page while</a:t>
+            </a:r>
+            <a:r>
+              <a:rPr lang="en-US" baseline="0" dirty="0" smtClean="0"/>
+              <a:t> designing systems agnostic than programming languages.</a:t>
+            </a:r>
             <a:endParaRPr lang="en-US" dirty="0"/>
           </a:p>
         </p:txBody>
@@ -1887,16 +1770,16 @@
           <a:p>
             <a:fld id="{D73FF19C-8393-2A49-92A3-90AE761DDBC5}" type="slidenum">
               <a:rPr lang="en-US" smtClean="0"/>
-              <a:t>27</a:t>
+              <a:t>21</a:t>
             </a:fld>
-            <a:endParaRPr lang="en-US"/>
+            <a:endParaRPr lang="en-US" dirty="0"/>
           </a:p>
         </p:txBody>
       </p:sp>
     </p:spTree>
     <p:extLst>
       <p:ext uri="{BB962C8B-B14F-4D97-AF65-F5344CB8AC3E}">
-        <p14:creationId xmlns:p14="http://schemas.microsoft.com/office/powerpoint/2010/main" val="3790448196"/>
+        <p14:creationId xmlns:p14="http://schemas.microsoft.com/office/powerpoint/2010/main" val="2496210755"/>
       </p:ext>
     </p:extLst>
   </p:cSld>
@@ -2061,24 +1944,28 @@
           <a:p>
             <a:r>
               <a:rPr lang="en-US" dirty="0" smtClean="0"/>
-              <a:t>Now that anyone can change</a:t>
+              <a:t>A class looks syntactically</a:t>
             </a:r>
             <a:r>
               <a:rPr lang="en-US" baseline="0" dirty="0" smtClean="0"/>
-              <a:t> the speed of a plane,</a:t>
-            </a:r>
-          </a:p>
-          <a:p>
-            <a:endParaRPr lang="en-US" baseline="0" dirty="0" smtClean="0"/>
+              <a:t> different in different languages, but essence is the same. [CLICK]</a:t>
+            </a:r>
           </a:p>
           <a:p>
             <a:r>
               <a:rPr lang="en-US" baseline="0" dirty="0" smtClean="0"/>
-              <a:t>But what if speed is out-of-range? Or invalid? Or maybe you should do just some adjustment to the speed before setting?</a:t>
+              <a:t>Here is a class in C#.</a:t>
             </a:r>
             <a:endParaRPr lang="en-US" dirty="0" smtClean="0"/>
           </a:p>
           <a:p>
+            <a:endParaRPr lang="en-US" dirty="0" smtClean="0"/>
+          </a:p>
+          <a:p>
+            <a:r>
+              <a:rPr lang="en-US" dirty="0" smtClean="0"/>
+              <a:t>BUT WAIT.</a:t>
+            </a:r>
             <a:endParaRPr lang="en-US" dirty="0"/>
           </a:p>
         </p:txBody>
@@ -2100,16 +1987,16 @@
           <a:p>
             <a:fld id="{D73FF19C-8393-2A49-92A3-90AE761DDBC5}" type="slidenum">
               <a:rPr lang="en-US" smtClean="0"/>
-              <a:t>29</a:t>
+              <a:t>23</a:t>
             </a:fld>
-            <a:endParaRPr lang="en-US"/>
+            <a:endParaRPr lang="en-US" dirty="0"/>
           </a:p>
         </p:txBody>
       </p:sp>
     </p:spTree>
     <p:extLst>
       <p:ext uri="{BB962C8B-B14F-4D97-AF65-F5344CB8AC3E}">
-        <p14:creationId xmlns:p14="http://schemas.microsoft.com/office/powerpoint/2010/main" val="556765515"/>
+        <p14:creationId xmlns:p14="http://schemas.microsoft.com/office/powerpoint/2010/main" val="503046212"/>
       </p:ext>
     </p:extLst>
   </p:cSld>
@@ -2165,33 +2052,76 @@
           <a:p>
             <a:r>
               <a:rPr lang="en-US" dirty="0" smtClean="0"/>
-              <a:t>Now what is the solution?</a:t>
-            </a:r>
-          </a:p>
-          <a:p>
+              <a:t>This is an object, [CLICK] this is an object,</a:t>
+            </a:r>
+            <a:r>
+              <a:rPr lang="en-US" baseline="0" dirty="0" smtClean="0"/>
+              <a:t> </a:t>
+            </a:r>
+            <a:r>
+              <a:rPr lang="en-US" dirty="0" smtClean="0"/>
+              <a:t>[CLICK] </a:t>
+            </a:r>
+            <a:r>
+              <a:rPr lang="en-US" baseline="0" dirty="0" smtClean="0"/>
+              <a:t>this is an object. </a:t>
+            </a:r>
+            <a:r>
+              <a:rPr lang="en-US" dirty="0" smtClean="0"/>
+              <a:t>[CLICK]</a:t>
+            </a:r>
+            <a:endParaRPr lang="en-US" baseline="0" dirty="0" smtClean="0"/>
+          </a:p>
+          <a:p>
+            <a:endParaRPr lang="en-US" baseline="0" dirty="0" smtClean="0"/>
+          </a:p>
+          <a:p>
+            <a:r>
+              <a:rPr lang="en-US" baseline="0" dirty="0" smtClean="0"/>
+              <a:t>Now this is a class. You got the idea.</a:t>
+            </a:r>
             <a:endParaRPr lang="en-US" dirty="0" smtClean="0"/>
           </a:p>
           <a:p>
+            <a:endParaRPr lang="en-US" dirty="0" smtClean="0"/>
+          </a:p>
+          <a:p>
             <a:r>
               <a:rPr lang="en-US" dirty="0" smtClean="0"/>
-              <a:t>OOD gives us this visibility modifiers:</a:t>
-            </a:r>
-            <a:r>
-              <a:rPr lang="en-US" baseline="0" dirty="0" smtClean="0"/>
-              <a:t> public, private etc. So that any attribute can be hidden from public if needed.</a:t>
-            </a:r>
-          </a:p>
-          <a:p>
-            <a:endParaRPr lang="en-US" baseline="0" dirty="0" smtClean="0"/>
-          </a:p>
-          <a:p>
-            <a:endParaRPr lang="en-US" baseline="0" dirty="0" smtClean="0"/>
-          </a:p>
-          <a:p>
-            <a:r>
-              <a:rPr lang="en-US" baseline="0" dirty="0" smtClean="0"/>
-              <a:t>Now speed will be adjusted whenever set externally.</a:t>
-            </a:r>
+              <a:t>Basically</a:t>
+            </a:r>
+            <a:r>
+              <a:rPr lang="en-US" dirty="0" smtClean="0"/>
+              <a:t>, we get the properties that all the dogs have and define a </a:t>
+            </a:r>
+            <a:r>
+              <a:rPr lang="en-US" dirty="0" smtClean="0">
+                <a:solidFill>
+                  <a:srgbClr val="FF0000"/>
+                </a:solidFill>
+              </a:rPr>
+              <a:t>Dog</a:t>
+            </a:r>
+            <a:r>
+              <a:rPr lang="en-US" dirty="0" smtClean="0"/>
+              <a:t> class with them.</a:t>
+            </a:r>
+          </a:p>
+          <a:p>
+            <a:pPr lvl="1"/>
+            <a:r>
+              <a:rPr lang="en-US" dirty="0" smtClean="0"/>
+              <a:t>A class is a generalization of objects.</a:t>
+            </a:r>
+          </a:p>
+          <a:p>
+            <a:pPr lvl="1"/>
+            <a:r>
+              <a:rPr lang="en-US" dirty="0" smtClean="0"/>
+              <a:t>And objects are just instances of the class.</a:t>
+            </a:r>
+          </a:p>
+          <a:p>
             <a:endParaRPr lang="en-US" dirty="0"/>
           </a:p>
         </p:txBody>
@@ -2213,7 +2143,7 @@
           <a:p>
             <a:fld id="{D73FF19C-8393-2A49-92A3-90AE761DDBC5}" type="slidenum">
               <a:rPr lang="en-US" smtClean="0"/>
-              <a:t>30</a:t>
+              <a:t>24</a:t>
             </a:fld>
             <a:endParaRPr lang="en-US"/>
           </a:p>
@@ -2222,7 +2152,7 @@
     </p:spTree>
     <p:extLst>
       <p:ext uri="{BB962C8B-B14F-4D97-AF65-F5344CB8AC3E}">
-        <p14:creationId xmlns:p14="http://schemas.microsoft.com/office/powerpoint/2010/main" val="1878050393"/>
+        <p14:creationId xmlns:p14="http://schemas.microsoft.com/office/powerpoint/2010/main" val="416629319"/>
       </p:ext>
     </p:extLst>
   </p:cSld>
@@ -2276,6 +2206,14 @@
           <a:bodyPr/>
           <a:lstStyle/>
           <a:p>
+            <a:r>
+              <a:rPr lang="en-US" dirty="0" smtClean="0"/>
+              <a:t>Constructors</a:t>
+            </a:r>
+            <a:r>
+              <a:rPr lang="en-US" baseline="0" dirty="0" smtClean="0"/>
+              <a:t> are getting this general information and creates an instance out of it.</a:t>
+            </a:r>
             <a:endParaRPr lang="en-US" dirty="0"/>
           </a:p>
         </p:txBody>
@@ -2297,16 +2235,16 @@
           <a:p>
             <a:fld id="{D73FF19C-8393-2A49-92A3-90AE761DDBC5}" type="slidenum">
               <a:rPr lang="en-US" smtClean="0"/>
-              <a:t>31</a:t>
+              <a:t>25</a:t>
             </a:fld>
-            <a:endParaRPr lang="en-US"/>
+            <a:endParaRPr lang="en-US" dirty="0"/>
           </a:p>
         </p:txBody>
       </p:sp>
     </p:spTree>
     <p:extLst>
       <p:ext uri="{BB962C8B-B14F-4D97-AF65-F5344CB8AC3E}">
-        <p14:creationId xmlns:p14="http://schemas.microsoft.com/office/powerpoint/2010/main" val="3720302838"/>
+        <p14:creationId xmlns:p14="http://schemas.microsoft.com/office/powerpoint/2010/main" val="1181162615"/>
       </p:ext>
     </p:extLst>
   </p:cSld>
@@ -2360,6 +2298,52 @@
           <a:bodyPr/>
           <a:lstStyle/>
           <a:p>
+            <a:r>
+              <a:rPr lang="en-US" dirty="0" smtClean="0"/>
+              <a:t>You remember we had this code piece that’s has lots of duplicates.</a:t>
+            </a:r>
+          </a:p>
+          <a:p>
+            <a:endParaRPr lang="en-US" dirty="0" smtClean="0"/>
+          </a:p>
+          <a:p>
+            <a:r>
+              <a:rPr lang="en-US" dirty="0" smtClean="0"/>
+              <a:t>Let’s see if</a:t>
+            </a:r>
+            <a:r>
+              <a:rPr lang="en-US" baseline="0" dirty="0" smtClean="0"/>
+              <a:t> how it will look like after OOD is applied</a:t>
+            </a:r>
+            <a:r>
+              <a:rPr lang="en-US" baseline="0" dirty="0" smtClean="0"/>
+              <a:t>.</a:t>
+            </a:r>
+          </a:p>
+          <a:p>
+            <a:r>
+              <a:rPr lang="en-US" baseline="0" dirty="0" smtClean="0"/>
+              <a:t>Of course, we would have classes for animals, dogs, and chickens and some properties attached to them.</a:t>
+            </a:r>
+          </a:p>
+          <a:p>
+            <a:r>
+              <a:rPr lang="en-US" baseline="0" dirty="0" smtClean="0"/>
+              <a:t> </a:t>
+            </a:r>
+            <a:r>
+              <a:rPr lang="en-US" baseline="0" dirty="0" smtClean="0"/>
+              <a:t>[CLICK]</a:t>
+            </a:r>
+          </a:p>
+          <a:p>
+            <a:endParaRPr lang="en-US" baseline="0" dirty="0" smtClean="0"/>
+          </a:p>
+          <a:p>
+            <a:r>
+              <a:rPr lang="en-US" baseline="0" dirty="0" smtClean="0"/>
+              <a:t>And this is how they are created as an object. Remember creating objects from classes. [CLICK]</a:t>
+            </a:r>
             <a:endParaRPr lang="en-US" dirty="0"/>
           </a:p>
         </p:txBody>
@@ -2381,7 +2365,7 @@
           <a:p>
             <a:fld id="{D73FF19C-8393-2A49-92A3-90AE761DDBC5}" type="slidenum">
               <a:rPr lang="en-US" smtClean="0"/>
-              <a:t>32</a:t>
+              <a:t>26</a:t>
             </a:fld>
             <a:endParaRPr lang="en-US"/>
           </a:p>
@@ -2390,7 +2374,7 @@
     </p:spTree>
     <p:extLst>
       <p:ext uri="{BB962C8B-B14F-4D97-AF65-F5344CB8AC3E}">
-        <p14:creationId xmlns:p14="http://schemas.microsoft.com/office/powerpoint/2010/main" val="2969744407"/>
+        <p14:creationId xmlns:p14="http://schemas.microsoft.com/office/powerpoint/2010/main" val="1389575709"/>
       </p:ext>
     </p:extLst>
   </p:cSld>
@@ -2462,22 +2446,159 @@
               <a:defRPr/>
             </a:pPr>
             <a:r>
-              <a:rPr lang="en-US" dirty="0" smtClean="0"/>
-              <a:t>So, you remember our Dog and Chicken example. They were both animals.</a:t>
-            </a:r>
-          </a:p>
-          <a:p>
-            <a:endParaRPr lang="en-US" dirty="0" smtClean="0"/>
-          </a:p>
-          <a:p>
-            <a:r>
-              <a:rPr lang="en-US" dirty="0" smtClean="0"/>
-              <a:t>So why shouldn’t we create a common class for the common properties/methods</a:t>
-            </a:r>
-            <a:r>
-              <a:rPr lang="en-US" baseline="0" dirty="0" smtClean="0"/>
-              <a:t> of this two animals.</a:t>
-            </a:r>
+              <a:rPr lang="en-US" sz="1200" dirty="0" smtClean="0">
+                <a:solidFill>
+                  <a:srgbClr val="FF0000"/>
+                </a:solidFill>
+              </a:rPr>
+              <a:t>Of course, no</a:t>
+            </a:r>
+            <a:r>
+              <a:rPr lang="en-US" sz="1200" baseline="0" dirty="0" smtClean="0">
+                <a:solidFill>
+                  <a:srgbClr val="FF0000"/>
+                </a:solidFill>
+              </a:rPr>
+              <a:t> fancy approach is without its consequences. OOD has lots of principles and concepts.</a:t>
+            </a:r>
+            <a:endParaRPr lang="en-US" sz="1200" dirty="0" smtClean="0">
+              <a:solidFill>
+                <a:srgbClr val="FF0000"/>
+              </a:solidFill>
+            </a:endParaRPr>
+          </a:p>
+          <a:p>
+            <a:pPr marL="0" marR="0" lvl="0" indent="0" algn="l" defTabSz="457200" rtl="0" eaLnBrk="1" fontAlgn="auto" latinLnBrk="0" hangingPunct="1">
+              <a:lnSpc>
+                <a:spcPct val="100000"/>
+              </a:lnSpc>
+              <a:spcBef>
+                <a:spcPts val="0"/>
+              </a:spcBef>
+              <a:spcAft>
+                <a:spcPts val="0"/>
+              </a:spcAft>
+              <a:buClrTx/>
+              <a:buSzTx/>
+              <a:buFontTx/>
+              <a:buNone/>
+              <a:tabLst/>
+              <a:defRPr/>
+            </a:pPr>
+            <a:endParaRPr lang="en-US" sz="1200" dirty="0" smtClean="0">
+              <a:solidFill>
+                <a:srgbClr val="FF0000"/>
+              </a:solidFill>
+            </a:endParaRPr>
+          </a:p>
+          <a:p>
+            <a:pPr marL="0" marR="0" lvl="0" indent="0" algn="l" defTabSz="457200" rtl="0" eaLnBrk="1" fontAlgn="auto" latinLnBrk="0" hangingPunct="1">
+              <a:lnSpc>
+                <a:spcPct val="100000"/>
+              </a:lnSpc>
+              <a:spcBef>
+                <a:spcPts val="0"/>
+              </a:spcBef>
+              <a:spcAft>
+                <a:spcPts val="0"/>
+              </a:spcAft>
+              <a:buClrTx/>
+              <a:buSzTx/>
+              <a:buFontTx/>
+              <a:buNone/>
+              <a:tabLst/>
+              <a:defRPr/>
+            </a:pPr>
+            <a:r>
+              <a:rPr lang="en-US" sz="1200" dirty="0" smtClean="0">
+                <a:solidFill>
+                  <a:srgbClr val="FF0000"/>
+                </a:solidFill>
+              </a:rPr>
+              <a:t>If we don’t use these concepts and obey these principles, we aren’t coding in proper object-oriented way</a:t>
+            </a:r>
+            <a:r>
+              <a:rPr lang="en-US" sz="1200" dirty="0" smtClean="0">
+                <a:solidFill>
+                  <a:srgbClr val="FF0000"/>
+                </a:solidFill>
+              </a:rPr>
+              <a:t>. And</a:t>
+            </a:r>
+            <a:r>
+              <a:rPr lang="en-US" sz="1200" baseline="0" dirty="0" smtClean="0">
+                <a:solidFill>
+                  <a:srgbClr val="FF0000"/>
+                </a:solidFill>
+              </a:rPr>
+              <a:t> we are basically coding in the old way but with extra complexities.</a:t>
+            </a:r>
+          </a:p>
+          <a:p>
+            <a:pPr marL="0" marR="0" lvl="0" indent="0" algn="l" defTabSz="457200" rtl="0" eaLnBrk="1" fontAlgn="auto" latinLnBrk="0" hangingPunct="1">
+              <a:lnSpc>
+                <a:spcPct val="100000"/>
+              </a:lnSpc>
+              <a:spcBef>
+                <a:spcPts val="0"/>
+              </a:spcBef>
+              <a:spcAft>
+                <a:spcPts val="0"/>
+              </a:spcAft>
+              <a:buClrTx/>
+              <a:buSzTx/>
+              <a:buFontTx/>
+              <a:buNone/>
+              <a:tabLst/>
+              <a:defRPr/>
+            </a:pPr>
+            <a:endParaRPr lang="en-US" sz="1200" baseline="0" dirty="0" smtClean="0">
+              <a:solidFill>
+                <a:srgbClr val="FF0000"/>
+              </a:solidFill>
+            </a:endParaRPr>
+          </a:p>
+          <a:p>
+            <a:pPr marL="0" marR="0" lvl="0" indent="0" algn="l" defTabSz="457200" rtl="0" eaLnBrk="1" fontAlgn="auto" latinLnBrk="0" hangingPunct="1">
+              <a:lnSpc>
+                <a:spcPct val="100000"/>
+              </a:lnSpc>
+              <a:spcBef>
+                <a:spcPts val="0"/>
+              </a:spcBef>
+              <a:spcAft>
+                <a:spcPts val="0"/>
+              </a:spcAft>
+              <a:buClrTx/>
+              <a:buSzTx/>
+              <a:buFontTx/>
+              <a:buNone/>
+              <a:tabLst/>
+              <a:defRPr/>
+            </a:pPr>
+            <a:r>
+              <a:rPr lang="en-US" sz="1200" baseline="0" dirty="0" smtClean="0">
+                <a:solidFill>
+                  <a:srgbClr val="FF0000"/>
+                </a:solidFill>
+              </a:rPr>
+              <a:t>It is like your car can go 100 kilometers per hour but you insist to go with a 30 on a highway because you don’t want to mess with the car and scare about what happens if something </a:t>
+            </a:r>
+            <a:r>
+              <a:rPr lang="en-US" sz="1200" baseline="0" smtClean="0">
+                <a:solidFill>
+                  <a:srgbClr val="FF0000"/>
+                </a:solidFill>
+              </a:rPr>
+              <a:t>goes wrong.</a:t>
+            </a:r>
+            <a:endParaRPr lang="en-US" sz="1200" dirty="0" smtClean="0">
+              <a:solidFill>
+                <a:srgbClr val="FF0000"/>
+              </a:solidFill>
+            </a:endParaRPr>
+          </a:p>
+          <a:p>
             <a:endParaRPr lang="en-US" dirty="0"/>
           </a:p>
         </p:txBody>
@@ -2499,7 +2620,7 @@
           <a:p>
             <a:fld id="{D73FF19C-8393-2A49-92A3-90AE761DDBC5}" type="slidenum">
               <a:rPr lang="en-US" smtClean="0"/>
-              <a:t>33</a:t>
+              <a:t>27</a:t>
             </a:fld>
             <a:endParaRPr lang="en-US"/>
           </a:p>
@@ -2508,7 +2629,7 @@
     </p:spTree>
     <p:extLst>
       <p:ext uri="{BB962C8B-B14F-4D97-AF65-F5344CB8AC3E}">
-        <p14:creationId xmlns:p14="http://schemas.microsoft.com/office/powerpoint/2010/main" val="800240373"/>
+        <p14:creationId xmlns:p14="http://schemas.microsoft.com/office/powerpoint/2010/main" val="3790448196"/>
       </p:ext>
     </p:extLst>
   </p:cSld>
@@ -2564,12 +2685,24 @@
           <a:p>
             <a:r>
               <a:rPr lang="en-US" dirty="0" smtClean="0"/>
-              <a:t>So</a:t>
+              <a:t>Now that anyone can change</a:t>
             </a:r>
             <a:r>
               <a:rPr lang="en-US" baseline="0" dirty="0" smtClean="0"/>
-              <a:t> you have two data formats to read into your program, and the functions that do the read is somewhat similar.</a:t>
-            </a:r>
+              <a:t> the speed of a plane,</a:t>
+            </a:r>
+          </a:p>
+          <a:p>
+            <a:endParaRPr lang="en-US" baseline="0" dirty="0" smtClean="0"/>
+          </a:p>
+          <a:p>
+            <a:r>
+              <a:rPr lang="en-US" baseline="0" dirty="0" smtClean="0"/>
+              <a:t>But what if speed is out-of-range? Or invalid? Or maybe you should do just some adjustment to the speed before setting?</a:t>
+            </a:r>
+            <a:endParaRPr lang="en-US" dirty="0" smtClean="0"/>
+          </a:p>
+          <a:p>
             <a:endParaRPr lang="en-US" dirty="0"/>
           </a:p>
         </p:txBody>
@@ -2591,7 +2724,7 @@
           <a:p>
             <a:fld id="{D73FF19C-8393-2A49-92A3-90AE761DDBC5}" type="slidenum">
               <a:rPr lang="en-US" smtClean="0"/>
-              <a:t>34</a:t>
+              <a:t>29</a:t>
             </a:fld>
             <a:endParaRPr lang="en-US"/>
           </a:p>
@@ -2600,7 +2733,7 @@
     </p:spTree>
     <p:extLst>
       <p:ext uri="{BB962C8B-B14F-4D97-AF65-F5344CB8AC3E}">
-        <p14:creationId xmlns:p14="http://schemas.microsoft.com/office/powerpoint/2010/main" val="2654794936"/>
+        <p14:creationId xmlns:p14="http://schemas.microsoft.com/office/powerpoint/2010/main" val="556765515"/>
       </p:ext>
     </p:extLst>
   </p:cSld>
@@ -2656,87 +2789,32 @@
           <a:p>
             <a:r>
               <a:rPr lang="en-US" dirty="0" smtClean="0"/>
-              <a:t>If a class has methods for:</a:t>
-            </a:r>
-          </a:p>
-          <a:p>
-            <a:pPr lvl="1"/>
+              <a:t>Now what is the solution?</a:t>
+            </a:r>
+          </a:p>
+          <a:p>
+            <a:endParaRPr lang="en-US" dirty="0" smtClean="0"/>
+          </a:p>
+          <a:p>
             <a:r>
               <a:rPr lang="en-US" dirty="0" smtClean="0"/>
-              <a:t>Printing a document</a:t>
-            </a:r>
-          </a:p>
-          <a:p>
-            <a:pPr lvl="1"/>
-            <a:r>
-              <a:rPr lang="en-US" dirty="0" smtClean="0"/>
-              <a:t>Sending an email</a:t>
-            </a:r>
-          </a:p>
-          <a:p>
-            <a:pPr lvl="1"/>
-            <a:r>
-              <a:rPr lang="en-US" dirty="0" smtClean="0"/>
-              <a:t>Working with trigonometric functions</a:t>
-            </a:r>
-          </a:p>
-          <a:p>
-            <a:pPr lvl="1"/>
-            <a:r>
-              <a:rPr lang="en-US" dirty="0" smtClean="0"/>
-              <a:t>How should we name it? Complicated, right?</a:t>
-            </a:r>
-          </a:p>
-          <a:p>
-            <a:endParaRPr lang="en-US" dirty="0" smtClean="0"/>
-          </a:p>
-          <a:p>
-            <a:endParaRPr lang="en-US" dirty="0" smtClean="0"/>
-          </a:p>
-          <a:p>
-            <a:r>
-              <a:rPr lang="en-US" dirty="0" smtClean="0"/>
-              <a:t>Strong cohesion is good</a:t>
+              <a:t>OOD gives us this visibility modifiers:</a:t>
             </a:r>
             <a:r>
               <a:rPr lang="en-US" baseline="0" dirty="0" smtClean="0"/>
-              <a:t> and a desired feature.</a:t>
-            </a:r>
+              <a:t> public, private etc. So that any attribute can be hidden from public if needed.</a:t>
+            </a:r>
+          </a:p>
+          <a:p>
+            <a:endParaRPr lang="en-US" baseline="0" dirty="0" smtClean="0"/>
+          </a:p>
+          <a:p>
+            <a:endParaRPr lang="en-US" baseline="0" dirty="0" smtClean="0"/>
           </a:p>
           <a:p>
             <a:r>
               <a:rPr lang="en-US" baseline="0" dirty="0" smtClean="0"/>
-              <a:t>It</a:t>
-            </a:r>
-            <a:r>
-              <a:rPr lang="en-US" dirty="0" smtClean="0"/>
-              <a:t> means: all methods of a class are more or less related.</a:t>
-            </a:r>
-          </a:p>
-          <a:p>
-            <a:r>
-              <a:rPr lang="en-US" dirty="0" smtClean="0"/>
-              <a:t>-A math class for example,</a:t>
-            </a:r>
-            <a:r>
-              <a:rPr lang="en-US" baseline="0" dirty="0" smtClean="0"/>
-              <a:t> which can compute </a:t>
-            </a:r>
-            <a:r>
-              <a:rPr lang="en-US" baseline="0" dirty="0" err="1" smtClean="0"/>
-              <a:t>sqrt</a:t>
-            </a:r>
-            <a:r>
-              <a:rPr lang="en-US" baseline="0" dirty="0" smtClean="0"/>
-              <a:t>, power, </a:t>
-            </a:r>
-            <a:r>
-              <a:rPr lang="en-US" baseline="0" dirty="0" err="1" smtClean="0"/>
-              <a:t>exp</a:t>
-            </a:r>
-            <a:r>
-              <a:rPr lang="en-US" baseline="0" dirty="0" smtClean="0"/>
-              <a:t>, cos etc.</a:t>
+              <a:t>Now speed will be adjusted whenever set externally.</a:t>
             </a:r>
             <a:endParaRPr lang="en-US" dirty="0"/>
           </a:p>
@@ -2759,7 +2837,7 @@
           <a:p>
             <a:fld id="{D73FF19C-8393-2A49-92A3-90AE761DDBC5}" type="slidenum">
               <a:rPr lang="en-US" smtClean="0"/>
-              <a:t>39</a:t>
+              <a:t>30</a:t>
             </a:fld>
             <a:endParaRPr lang="en-US"/>
           </a:p>
@@ -2768,7 +2846,7 @@
     </p:spTree>
     <p:extLst>
       <p:ext uri="{BB962C8B-B14F-4D97-AF65-F5344CB8AC3E}">
-        <p14:creationId xmlns:p14="http://schemas.microsoft.com/office/powerpoint/2010/main" val="1864651759"/>
+        <p14:creationId xmlns:p14="http://schemas.microsoft.com/office/powerpoint/2010/main" val="1878050393"/>
       </p:ext>
     </p:extLst>
   </p:cSld>
@@ -2822,85 +2900,6 @@
           <a:bodyPr/>
           <a:lstStyle/>
           <a:p>
-            <a:pPr marL="0" marR="0" lvl="0" indent="0" algn="l" defTabSz="457200" rtl="0" eaLnBrk="1" fontAlgn="auto" latinLnBrk="0" hangingPunct="1">
-              <a:lnSpc>
-                <a:spcPct val="100000"/>
-              </a:lnSpc>
-              <a:spcBef>
-                <a:spcPts val="0"/>
-              </a:spcBef>
-              <a:spcAft>
-                <a:spcPts val="0"/>
-              </a:spcAft>
-              <a:buClrTx/>
-              <a:buSzTx/>
-              <a:buFontTx/>
-              <a:buNone/>
-              <a:tabLst/>
-              <a:defRPr/>
-            </a:pPr>
-            <a:r>
-              <a:rPr lang="en-US" dirty="0" smtClean="0"/>
-              <a:t>Whenever we add a new shape to the system, we should go and</a:t>
-            </a:r>
-            <a:r>
-              <a:rPr lang="en-US" baseline="0" dirty="0" smtClean="0"/>
-              <a:t> modify this method of area calculator.</a:t>
-            </a:r>
-          </a:p>
-          <a:p>
-            <a:pPr marL="0" marR="0" lvl="0" indent="0" algn="l" defTabSz="457200" rtl="0" eaLnBrk="1" fontAlgn="auto" latinLnBrk="0" hangingPunct="1">
-              <a:lnSpc>
-                <a:spcPct val="100000"/>
-              </a:lnSpc>
-              <a:spcBef>
-                <a:spcPts val="0"/>
-              </a:spcBef>
-              <a:spcAft>
-                <a:spcPts val="0"/>
-              </a:spcAft>
-              <a:buClrTx/>
-              <a:buSzTx/>
-              <a:buFontTx/>
-              <a:buNone/>
-              <a:tabLst/>
-              <a:defRPr/>
-            </a:pPr>
-            <a:endParaRPr lang="en-US" baseline="0" dirty="0" smtClean="0"/>
-          </a:p>
-          <a:p>
-            <a:pPr marL="0" marR="0" lvl="0" indent="0" algn="l" defTabSz="457200" rtl="0" eaLnBrk="1" fontAlgn="auto" latinLnBrk="0" hangingPunct="1">
-              <a:lnSpc>
-                <a:spcPct val="100000"/>
-              </a:lnSpc>
-              <a:spcBef>
-                <a:spcPts val="0"/>
-              </a:spcBef>
-              <a:spcAft>
-                <a:spcPts val="0"/>
-              </a:spcAft>
-              <a:buClrTx/>
-              <a:buSzTx/>
-              <a:buFontTx/>
-              <a:buNone/>
-              <a:tabLst/>
-              <a:defRPr/>
-            </a:pPr>
-            <a:r>
-              <a:rPr lang="en-US" baseline="0" dirty="0" smtClean="0"/>
-              <a:t>So, this class [</a:t>
-            </a:r>
-            <a:r>
-              <a:rPr lang="en-US" baseline="0" dirty="0" err="1" smtClean="0"/>
-              <a:t>AreaCalculator</a:t>
-            </a:r>
-            <a:r>
-              <a:rPr lang="en-US" baseline="0" dirty="0" smtClean="0"/>
-              <a:t>] is not closed to modification.</a:t>
-            </a:r>
-            <a:endParaRPr lang="en-US" dirty="0" smtClean="0"/>
-          </a:p>
-          <a:p>
             <a:endParaRPr lang="en-US" dirty="0"/>
           </a:p>
         </p:txBody>
@@ -2922,16 +2921,16 @@
           <a:p>
             <a:fld id="{D73FF19C-8393-2A49-92A3-90AE761DDBC5}" type="slidenum">
               <a:rPr lang="en-US" smtClean="0"/>
-              <a:t>44</a:t>
+              <a:t>31</a:t>
             </a:fld>
-            <a:endParaRPr lang="en-US" dirty="0"/>
+            <a:endParaRPr lang="en-US"/>
           </a:p>
         </p:txBody>
       </p:sp>
     </p:spTree>
     <p:extLst>
       <p:ext uri="{BB962C8B-B14F-4D97-AF65-F5344CB8AC3E}">
-        <p14:creationId xmlns:p14="http://schemas.microsoft.com/office/powerpoint/2010/main" val="3224651124"/>
+        <p14:creationId xmlns:p14="http://schemas.microsoft.com/office/powerpoint/2010/main" val="3720302838"/>
       </p:ext>
     </p:extLst>
   </p:cSld>
@@ -2985,14 +2984,6 @@
           <a:bodyPr/>
           <a:lstStyle/>
           <a:p>
-            <a:r>
-              <a:rPr lang="en-US" dirty="0" smtClean="0"/>
-              <a:t>This doesn’t necessarily mean they have to have one</a:t>
-            </a:r>
-            <a:r>
-              <a:rPr lang="en-US" baseline="0" dirty="0" smtClean="0"/>
-              <a:t> method.</a:t>
-            </a:r>
             <a:endParaRPr lang="en-US" dirty="0"/>
           </a:p>
         </p:txBody>
@@ -3014,16 +3005,16 @@
           <a:p>
             <a:fld id="{D73FF19C-8393-2A49-92A3-90AE761DDBC5}" type="slidenum">
               <a:rPr lang="en-US" smtClean="0"/>
-              <a:t>46</a:t>
+              <a:t>32</a:t>
             </a:fld>
-            <a:endParaRPr lang="en-US" dirty="0"/>
+            <a:endParaRPr lang="en-US"/>
           </a:p>
         </p:txBody>
       </p:sp>
     </p:spTree>
     <p:extLst>
       <p:ext uri="{BB962C8B-B14F-4D97-AF65-F5344CB8AC3E}">
-        <p14:creationId xmlns:p14="http://schemas.microsoft.com/office/powerpoint/2010/main" val="1372388394"/>
+        <p14:creationId xmlns:p14="http://schemas.microsoft.com/office/powerpoint/2010/main" val="2969744407"/>
       </p:ext>
     </p:extLst>
   </p:cSld>
@@ -3077,57 +3068,40 @@
           <a:bodyPr/>
           <a:lstStyle/>
           <a:p>
+            <a:pPr marL="0" marR="0" lvl="0" indent="0" algn="l" defTabSz="457200" rtl="0" eaLnBrk="1" fontAlgn="auto" latinLnBrk="0" hangingPunct="1">
+              <a:lnSpc>
+                <a:spcPct val="100000"/>
+              </a:lnSpc>
+              <a:spcBef>
+                <a:spcPts val="0"/>
+              </a:spcBef>
+              <a:spcAft>
+                <a:spcPts val="0"/>
+              </a:spcAft>
+              <a:buClrTx/>
+              <a:buSzTx/>
+              <a:buFontTx/>
+              <a:buNone/>
+              <a:tabLst/>
+              <a:defRPr/>
+            </a:pPr>
             <a:r>
               <a:rPr lang="en-US" dirty="0" smtClean="0"/>
-              <a:t>Usually the violation of this principle can be identified by asking:</a:t>
-            </a:r>
-          </a:p>
-          <a:p>
-            <a:pPr lvl="1"/>
+              <a:t>So, you remember our Dog and Chicken example. They were both animals.</a:t>
+            </a:r>
+          </a:p>
+          <a:p>
+            <a:endParaRPr lang="en-US" dirty="0" smtClean="0"/>
+          </a:p>
+          <a:p>
             <a:r>
               <a:rPr lang="en-US" dirty="0" smtClean="0"/>
-              <a:t>Can _______   _________ itself?</a:t>
-            </a:r>
-          </a:p>
-          <a:p>
-            <a:pPr lvl="2"/>
-            <a:r>
-              <a:rPr lang="en-US" dirty="0" smtClean="0"/>
-              <a:t>Example:  Can </a:t>
-            </a:r>
-            <a:r>
-              <a:rPr lang="en-US" dirty="0" smtClean="0">
-                <a:solidFill>
-                  <a:srgbClr val="FF0000"/>
-                </a:solidFill>
-              </a:rPr>
-              <a:t>Automobile</a:t>
-            </a:r>
-            <a:r>
-              <a:rPr lang="en-US" dirty="0" smtClean="0"/>
-              <a:t> </a:t>
-            </a:r>
-            <a:r>
-              <a:rPr lang="en-US" dirty="0" err="1" smtClean="0">
-                <a:solidFill>
-                  <a:srgbClr val="FF0000"/>
-                </a:solidFill>
-              </a:rPr>
-              <a:t>changeTires</a:t>
-            </a:r>
-            <a:r>
-              <a:rPr lang="en-US" dirty="0" smtClean="0"/>
-              <a:t> itself?</a:t>
-            </a:r>
-          </a:p>
-          <a:p>
-            <a:pPr lvl="2"/>
-            <a:r>
-              <a:rPr lang="en-US" dirty="0" smtClean="0"/>
-              <a:t>If it is no, it is violating SRP.</a:t>
-            </a:r>
-          </a:p>
-          <a:p>
+              <a:t>So why shouldn’t we create a common class for the common properties/methods</a:t>
+            </a:r>
+            <a:r>
+              <a:rPr lang="en-US" baseline="0" dirty="0" smtClean="0"/>
+              <a:t> of this two animals.</a:t>
+            </a:r>
             <a:endParaRPr lang="en-US" dirty="0"/>
           </a:p>
         </p:txBody>
@@ -3149,16 +3123,16 @@
           <a:p>
             <a:fld id="{D73FF19C-8393-2A49-92A3-90AE761DDBC5}" type="slidenum">
               <a:rPr lang="en-US" smtClean="0"/>
-              <a:t>47</a:t>
+              <a:t>33</a:t>
             </a:fld>
-            <a:endParaRPr lang="en-US" dirty="0"/>
+            <a:endParaRPr lang="en-US"/>
           </a:p>
         </p:txBody>
       </p:sp>
     </p:spTree>
     <p:extLst>
       <p:ext uri="{BB962C8B-B14F-4D97-AF65-F5344CB8AC3E}">
-        <p14:creationId xmlns:p14="http://schemas.microsoft.com/office/powerpoint/2010/main" val="891337501"/>
+        <p14:creationId xmlns:p14="http://schemas.microsoft.com/office/powerpoint/2010/main" val="800240373"/>
       </p:ext>
     </p:extLst>
   </p:cSld>
@@ -3304,6 +3278,266 @@
           <a:bodyPr/>
           <a:lstStyle/>
           <a:p>
+            <a:r>
+              <a:rPr lang="en-US" dirty="0" smtClean="0"/>
+              <a:t>So</a:t>
+            </a:r>
+            <a:r>
+              <a:rPr lang="en-US" baseline="0" dirty="0" smtClean="0"/>
+              <a:t> you have two data formats to read into your program, and the functions that do the read is somewhat similar.</a:t>
+            </a:r>
+            <a:endParaRPr lang="en-US" dirty="0"/>
+          </a:p>
+        </p:txBody>
+      </p:sp>
+      <p:sp>
+        <p:nvSpPr>
+          <p:cNvPr id="4" name="Slide Number Placeholder 3"/>
+          <p:cNvSpPr>
+            <a:spLocks noGrp="1"/>
+          </p:cNvSpPr>
+          <p:nvPr>
+            <p:ph type="sldNum" sz="quarter" idx="10"/>
+          </p:nvPr>
+        </p:nvSpPr>
+        <p:spPr/>
+        <p:txBody>
+          <a:bodyPr/>
+          <a:lstStyle/>
+          <a:p>
+            <a:fld id="{D73FF19C-8393-2A49-92A3-90AE761DDBC5}" type="slidenum">
+              <a:rPr lang="en-US" smtClean="0"/>
+              <a:t>34</a:t>
+            </a:fld>
+            <a:endParaRPr lang="en-US"/>
+          </a:p>
+        </p:txBody>
+      </p:sp>
+    </p:spTree>
+    <p:extLst>
+      <p:ext uri="{BB962C8B-B14F-4D97-AF65-F5344CB8AC3E}">
+        <p14:creationId xmlns:p14="http://schemas.microsoft.com/office/powerpoint/2010/main" val="2654794936"/>
+      </p:ext>
+    </p:extLst>
+  </p:cSld>
+  <p:clrMapOvr>
+    <a:masterClrMapping/>
+  </p:clrMapOvr>
+</p:notes>
+</file>
+
+<file path=ppt/notesSlides/notesSlide31.xml><?xml version="1.0" encoding="utf-8"?>
+<p:notes xmlns:a="http://schemas.openxmlformats.org/drawingml/2006/main" xmlns:r="http://schemas.openxmlformats.org/officeDocument/2006/relationships" xmlns:p="http://schemas.openxmlformats.org/presentationml/2006/main">
+  <p:cSld>
+    <p:spTree>
+      <p:nvGrpSpPr>
+        <p:cNvPr id="1" name=""/>
+        <p:cNvGrpSpPr/>
+        <p:nvPr/>
+      </p:nvGrpSpPr>
+      <p:grpSpPr>
+        <a:xfrm>
+          <a:off x="0" y="0"/>
+          <a:ext cx="0" cy="0"/>
+          <a:chOff x="0" y="0"/>
+          <a:chExt cx="0" cy="0"/>
+        </a:xfrm>
+      </p:grpSpPr>
+      <p:sp>
+        <p:nvSpPr>
+          <p:cNvPr id="2" name="Slide Image Placeholder 1"/>
+          <p:cNvSpPr>
+            <a:spLocks noGrp="1" noRot="1" noChangeAspect="1"/>
+          </p:cNvSpPr>
+          <p:nvPr>
+            <p:ph type="sldImg"/>
+          </p:nvPr>
+        </p:nvSpPr>
+        <p:spPr/>
+      </p:sp>
+      <p:sp>
+        <p:nvSpPr>
+          <p:cNvPr id="3" name="Notes Placeholder 2"/>
+          <p:cNvSpPr>
+            <a:spLocks noGrp="1"/>
+          </p:cNvSpPr>
+          <p:nvPr>
+            <p:ph type="body" idx="1"/>
+          </p:nvPr>
+        </p:nvSpPr>
+        <p:spPr/>
+        <p:txBody>
+          <a:bodyPr/>
+          <a:lstStyle/>
+          <a:p>
+            <a:r>
+              <a:rPr lang="en-US" dirty="0" smtClean="0"/>
+              <a:t>If a class has methods for:</a:t>
+            </a:r>
+          </a:p>
+          <a:p>
+            <a:pPr lvl="1"/>
+            <a:r>
+              <a:rPr lang="en-US" dirty="0" smtClean="0"/>
+              <a:t>Printing a document</a:t>
+            </a:r>
+          </a:p>
+          <a:p>
+            <a:pPr lvl="1"/>
+            <a:r>
+              <a:rPr lang="en-US" dirty="0" smtClean="0"/>
+              <a:t>Sending an email</a:t>
+            </a:r>
+          </a:p>
+          <a:p>
+            <a:pPr lvl="1"/>
+            <a:r>
+              <a:rPr lang="en-US" dirty="0" smtClean="0"/>
+              <a:t>Working with trigonometric functions</a:t>
+            </a:r>
+          </a:p>
+          <a:p>
+            <a:pPr lvl="1"/>
+            <a:r>
+              <a:rPr lang="en-US" dirty="0" smtClean="0"/>
+              <a:t>How should we name it? Complicated, right?</a:t>
+            </a:r>
+          </a:p>
+          <a:p>
+            <a:endParaRPr lang="en-US" dirty="0" smtClean="0"/>
+          </a:p>
+          <a:p>
+            <a:endParaRPr lang="en-US" dirty="0" smtClean="0"/>
+          </a:p>
+          <a:p>
+            <a:r>
+              <a:rPr lang="en-US" dirty="0" smtClean="0"/>
+              <a:t>Strong cohesion is good</a:t>
+            </a:r>
+            <a:r>
+              <a:rPr lang="en-US" baseline="0" dirty="0" smtClean="0"/>
+              <a:t> and a desired feature.</a:t>
+            </a:r>
+          </a:p>
+          <a:p>
+            <a:r>
+              <a:rPr lang="en-US" baseline="0" dirty="0" smtClean="0"/>
+              <a:t>It</a:t>
+            </a:r>
+            <a:r>
+              <a:rPr lang="en-US" dirty="0" smtClean="0"/>
+              <a:t> means: all methods of a class are more or less related.</a:t>
+            </a:r>
+          </a:p>
+          <a:p>
+            <a:r>
+              <a:rPr lang="en-US" dirty="0" smtClean="0"/>
+              <a:t>-A math class for example,</a:t>
+            </a:r>
+            <a:r>
+              <a:rPr lang="en-US" baseline="0" dirty="0" smtClean="0"/>
+              <a:t> which can compute </a:t>
+            </a:r>
+            <a:r>
+              <a:rPr lang="en-US" baseline="0" dirty="0" err="1" smtClean="0"/>
+              <a:t>sqrt</a:t>
+            </a:r>
+            <a:r>
+              <a:rPr lang="en-US" baseline="0" dirty="0" smtClean="0"/>
+              <a:t>, power, </a:t>
+            </a:r>
+            <a:r>
+              <a:rPr lang="en-US" baseline="0" dirty="0" err="1" smtClean="0"/>
+              <a:t>exp</a:t>
+            </a:r>
+            <a:r>
+              <a:rPr lang="en-US" baseline="0" dirty="0" smtClean="0"/>
+              <a:t>, cos etc.</a:t>
+            </a:r>
+            <a:endParaRPr lang="en-US" dirty="0"/>
+          </a:p>
+        </p:txBody>
+      </p:sp>
+      <p:sp>
+        <p:nvSpPr>
+          <p:cNvPr id="4" name="Slide Number Placeholder 3"/>
+          <p:cNvSpPr>
+            <a:spLocks noGrp="1"/>
+          </p:cNvSpPr>
+          <p:nvPr>
+            <p:ph type="sldNum" sz="quarter" idx="10"/>
+          </p:nvPr>
+        </p:nvSpPr>
+        <p:spPr/>
+        <p:txBody>
+          <a:bodyPr/>
+          <a:lstStyle/>
+          <a:p>
+            <a:fld id="{D73FF19C-8393-2A49-92A3-90AE761DDBC5}" type="slidenum">
+              <a:rPr lang="en-US" smtClean="0"/>
+              <a:t>39</a:t>
+            </a:fld>
+            <a:endParaRPr lang="en-US"/>
+          </a:p>
+        </p:txBody>
+      </p:sp>
+    </p:spTree>
+    <p:extLst>
+      <p:ext uri="{BB962C8B-B14F-4D97-AF65-F5344CB8AC3E}">
+        <p14:creationId xmlns:p14="http://schemas.microsoft.com/office/powerpoint/2010/main" val="1864651759"/>
+      </p:ext>
+    </p:extLst>
+  </p:cSld>
+  <p:clrMapOvr>
+    <a:masterClrMapping/>
+  </p:clrMapOvr>
+</p:notes>
+</file>
+
+<file path=ppt/notesSlides/notesSlide32.xml><?xml version="1.0" encoding="utf-8"?>
+<p:notes xmlns:a="http://schemas.openxmlformats.org/drawingml/2006/main" xmlns:r="http://schemas.openxmlformats.org/officeDocument/2006/relationships" xmlns:p="http://schemas.openxmlformats.org/presentationml/2006/main">
+  <p:cSld>
+    <p:spTree>
+      <p:nvGrpSpPr>
+        <p:cNvPr id="1" name=""/>
+        <p:cNvGrpSpPr/>
+        <p:nvPr/>
+      </p:nvGrpSpPr>
+      <p:grpSpPr>
+        <a:xfrm>
+          <a:off x="0" y="0"/>
+          <a:ext cx="0" cy="0"/>
+          <a:chOff x="0" y="0"/>
+          <a:chExt cx="0" cy="0"/>
+        </a:xfrm>
+      </p:grpSpPr>
+      <p:sp>
+        <p:nvSpPr>
+          <p:cNvPr id="2" name="Slide Image Placeholder 1"/>
+          <p:cNvSpPr>
+            <a:spLocks noGrp="1" noRot="1" noChangeAspect="1"/>
+          </p:cNvSpPr>
+          <p:nvPr>
+            <p:ph type="sldImg"/>
+          </p:nvPr>
+        </p:nvSpPr>
+        <p:spPr/>
+      </p:sp>
+      <p:sp>
+        <p:nvSpPr>
+          <p:cNvPr id="3" name="Notes Placeholder 2"/>
+          <p:cNvSpPr>
+            <a:spLocks noGrp="1"/>
+          </p:cNvSpPr>
+          <p:nvPr>
+            <p:ph type="body" idx="1"/>
+          </p:nvPr>
+        </p:nvSpPr>
+        <p:spPr/>
+        <p:txBody>
+          <a:bodyPr/>
+          <a:lstStyle/>
+          <a:p>
             <a:pPr marL="0" marR="0" lvl="0" indent="0" algn="l" defTabSz="457200" rtl="0" eaLnBrk="1" fontAlgn="auto" latinLnBrk="0" hangingPunct="1">
               <a:lnSpc>
                 <a:spcPct val="100000"/>
@@ -3322,6 +3556,396 @@
               <a:defRPr/>
             </a:pPr>
             <a:r>
+              <a:rPr lang="en-US" dirty="0" smtClean="0"/>
+              <a:t>Whenever we add a new shape to the system, we should go and</a:t>
+            </a:r>
+            <a:r>
+              <a:rPr lang="en-US" baseline="0" dirty="0" smtClean="0"/>
+              <a:t> modify this method of area calculator.</a:t>
+            </a:r>
+          </a:p>
+          <a:p>
+            <a:pPr marL="0" marR="0" lvl="0" indent="0" algn="l" defTabSz="457200" rtl="0" eaLnBrk="1" fontAlgn="auto" latinLnBrk="0" hangingPunct="1">
+              <a:lnSpc>
+                <a:spcPct val="100000"/>
+              </a:lnSpc>
+              <a:spcBef>
+                <a:spcPts val="0"/>
+              </a:spcBef>
+              <a:spcAft>
+                <a:spcPts val="0"/>
+              </a:spcAft>
+              <a:buClrTx/>
+              <a:buSzTx/>
+              <a:buFontTx/>
+              <a:buNone/>
+              <a:tabLst/>
+              <a:defRPr/>
+            </a:pPr>
+            <a:endParaRPr lang="en-US" baseline="0" dirty="0" smtClean="0"/>
+          </a:p>
+          <a:p>
+            <a:pPr marL="0" marR="0" lvl="0" indent="0" algn="l" defTabSz="457200" rtl="0" eaLnBrk="1" fontAlgn="auto" latinLnBrk="0" hangingPunct="1">
+              <a:lnSpc>
+                <a:spcPct val="100000"/>
+              </a:lnSpc>
+              <a:spcBef>
+                <a:spcPts val="0"/>
+              </a:spcBef>
+              <a:spcAft>
+                <a:spcPts val="0"/>
+              </a:spcAft>
+              <a:buClrTx/>
+              <a:buSzTx/>
+              <a:buFontTx/>
+              <a:buNone/>
+              <a:tabLst/>
+              <a:defRPr/>
+            </a:pPr>
+            <a:r>
+              <a:rPr lang="en-US" baseline="0" dirty="0" smtClean="0"/>
+              <a:t>So, this class [</a:t>
+            </a:r>
+            <a:r>
+              <a:rPr lang="en-US" baseline="0" dirty="0" err="1" smtClean="0"/>
+              <a:t>AreaCalculator</a:t>
+            </a:r>
+            <a:r>
+              <a:rPr lang="en-US" baseline="0" dirty="0" smtClean="0"/>
+              <a:t>] is not closed to modification.</a:t>
+            </a:r>
+            <a:endParaRPr lang="en-US" dirty="0" smtClean="0"/>
+          </a:p>
+          <a:p>
+            <a:endParaRPr lang="en-US" dirty="0"/>
+          </a:p>
+        </p:txBody>
+      </p:sp>
+      <p:sp>
+        <p:nvSpPr>
+          <p:cNvPr id="4" name="Slide Number Placeholder 3"/>
+          <p:cNvSpPr>
+            <a:spLocks noGrp="1"/>
+          </p:cNvSpPr>
+          <p:nvPr>
+            <p:ph type="sldNum" sz="quarter" idx="10"/>
+          </p:nvPr>
+        </p:nvSpPr>
+        <p:spPr/>
+        <p:txBody>
+          <a:bodyPr/>
+          <a:lstStyle/>
+          <a:p>
+            <a:fld id="{D73FF19C-8393-2A49-92A3-90AE761DDBC5}" type="slidenum">
+              <a:rPr lang="en-US" smtClean="0"/>
+              <a:t>44</a:t>
+            </a:fld>
+            <a:endParaRPr lang="en-US" dirty="0"/>
+          </a:p>
+        </p:txBody>
+      </p:sp>
+    </p:spTree>
+    <p:extLst>
+      <p:ext uri="{BB962C8B-B14F-4D97-AF65-F5344CB8AC3E}">
+        <p14:creationId xmlns:p14="http://schemas.microsoft.com/office/powerpoint/2010/main" val="3224651124"/>
+      </p:ext>
+    </p:extLst>
+  </p:cSld>
+  <p:clrMapOvr>
+    <a:masterClrMapping/>
+  </p:clrMapOvr>
+</p:notes>
+</file>
+
+<file path=ppt/notesSlides/notesSlide33.xml><?xml version="1.0" encoding="utf-8"?>
+<p:notes xmlns:a="http://schemas.openxmlformats.org/drawingml/2006/main" xmlns:r="http://schemas.openxmlformats.org/officeDocument/2006/relationships" xmlns:p="http://schemas.openxmlformats.org/presentationml/2006/main">
+  <p:cSld>
+    <p:spTree>
+      <p:nvGrpSpPr>
+        <p:cNvPr id="1" name=""/>
+        <p:cNvGrpSpPr/>
+        <p:nvPr/>
+      </p:nvGrpSpPr>
+      <p:grpSpPr>
+        <a:xfrm>
+          <a:off x="0" y="0"/>
+          <a:ext cx="0" cy="0"/>
+          <a:chOff x="0" y="0"/>
+          <a:chExt cx="0" cy="0"/>
+        </a:xfrm>
+      </p:grpSpPr>
+      <p:sp>
+        <p:nvSpPr>
+          <p:cNvPr id="2" name="Slide Image Placeholder 1"/>
+          <p:cNvSpPr>
+            <a:spLocks noGrp="1" noRot="1" noChangeAspect="1"/>
+          </p:cNvSpPr>
+          <p:nvPr>
+            <p:ph type="sldImg"/>
+          </p:nvPr>
+        </p:nvSpPr>
+        <p:spPr/>
+      </p:sp>
+      <p:sp>
+        <p:nvSpPr>
+          <p:cNvPr id="3" name="Notes Placeholder 2"/>
+          <p:cNvSpPr>
+            <a:spLocks noGrp="1"/>
+          </p:cNvSpPr>
+          <p:nvPr>
+            <p:ph type="body" idx="1"/>
+          </p:nvPr>
+        </p:nvSpPr>
+        <p:spPr/>
+        <p:txBody>
+          <a:bodyPr/>
+          <a:lstStyle/>
+          <a:p>
+            <a:r>
+              <a:rPr lang="en-US" dirty="0" smtClean="0"/>
+              <a:t>This doesn’t necessarily mean they have to have one</a:t>
+            </a:r>
+            <a:r>
+              <a:rPr lang="en-US" baseline="0" dirty="0" smtClean="0"/>
+              <a:t> method.</a:t>
+            </a:r>
+            <a:endParaRPr lang="en-US" dirty="0"/>
+          </a:p>
+        </p:txBody>
+      </p:sp>
+      <p:sp>
+        <p:nvSpPr>
+          <p:cNvPr id="4" name="Slide Number Placeholder 3"/>
+          <p:cNvSpPr>
+            <a:spLocks noGrp="1"/>
+          </p:cNvSpPr>
+          <p:nvPr>
+            <p:ph type="sldNum" sz="quarter" idx="10"/>
+          </p:nvPr>
+        </p:nvSpPr>
+        <p:spPr/>
+        <p:txBody>
+          <a:bodyPr/>
+          <a:lstStyle/>
+          <a:p>
+            <a:fld id="{D73FF19C-8393-2A49-92A3-90AE761DDBC5}" type="slidenum">
+              <a:rPr lang="en-US" smtClean="0"/>
+              <a:t>46</a:t>
+            </a:fld>
+            <a:endParaRPr lang="en-US" dirty="0"/>
+          </a:p>
+        </p:txBody>
+      </p:sp>
+    </p:spTree>
+    <p:extLst>
+      <p:ext uri="{BB962C8B-B14F-4D97-AF65-F5344CB8AC3E}">
+        <p14:creationId xmlns:p14="http://schemas.microsoft.com/office/powerpoint/2010/main" val="1372388394"/>
+      </p:ext>
+    </p:extLst>
+  </p:cSld>
+  <p:clrMapOvr>
+    <a:masterClrMapping/>
+  </p:clrMapOvr>
+</p:notes>
+</file>
+
+<file path=ppt/notesSlides/notesSlide34.xml><?xml version="1.0" encoding="utf-8"?>
+<p:notes xmlns:a="http://schemas.openxmlformats.org/drawingml/2006/main" xmlns:r="http://schemas.openxmlformats.org/officeDocument/2006/relationships" xmlns:p="http://schemas.openxmlformats.org/presentationml/2006/main">
+  <p:cSld>
+    <p:spTree>
+      <p:nvGrpSpPr>
+        <p:cNvPr id="1" name=""/>
+        <p:cNvGrpSpPr/>
+        <p:nvPr/>
+      </p:nvGrpSpPr>
+      <p:grpSpPr>
+        <a:xfrm>
+          <a:off x="0" y="0"/>
+          <a:ext cx="0" cy="0"/>
+          <a:chOff x="0" y="0"/>
+          <a:chExt cx="0" cy="0"/>
+        </a:xfrm>
+      </p:grpSpPr>
+      <p:sp>
+        <p:nvSpPr>
+          <p:cNvPr id="2" name="Slide Image Placeholder 1"/>
+          <p:cNvSpPr>
+            <a:spLocks noGrp="1" noRot="1" noChangeAspect="1"/>
+          </p:cNvSpPr>
+          <p:nvPr>
+            <p:ph type="sldImg"/>
+          </p:nvPr>
+        </p:nvSpPr>
+        <p:spPr/>
+      </p:sp>
+      <p:sp>
+        <p:nvSpPr>
+          <p:cNvPr id="3" name="Notes Placeholder 2"/>
+          <p:cNvSpPr>
+            <a:spLocks noGrp="1"/>
+          </p:cNvSpPr>
+          <p:nvPr>
+            <p:ph type="body" idx="1"/>
+          </p:nvPr>
+        </p:nvSpPr>
+        <p:spPr/>
+        <p:txBody>
+          <a:bodyPr/>
+          <a:lstStyle/>
+          <a:p>
+            <a:r>
+              <a:rPr lang="en-US" dirty="0" smtClean="0"/>
+              <a:t>Usually the violation of this principle can be identified by asking:</a:t>
+            </a:r>
+          </a:p>
+          <a:p>
+            <a:pPr lvl="1"/>
+            <a:r>
+              <a:rPr lang="en-US" dirty="0" smtClean="0"/>
+              <a:t>Can _______   _________ itself?</a:t>
+            </a:r>
+          </a:p>
+          <a:p>
+            <a:pPr lvl="2"/>
+            <a:r>
+              <a:rPr lang="en-US" dirty="0" smtClean="0"/>
+              <a:t>Example:  Can </a:t>
+            </a:r>
+            <a:r>
+              <a:rPr lang="en-US" dirty="0" smtClean="0">
+                <a:solidFill>
+                  <a:srgbClr val="FF0000"/>
+                </a:solidFill>
+              </a:rPr>
+              <a:t>Automobile</a:t>
+            </a:r>
+            <a:r>
+              <a:rPr lang="en-US" dirty="0" smtClean="0"/>
+              <a:t> </a:t>
+            </a:r>
+            <a:r>
+              <a:rPr lang="en-US" dirty="0" err="1" smtClean="0">
+                <a:solidFill>
+                  <a:srgbClr val="FF0000"/>
+                </a:solidFill>
+              </a:rPr>
+              <a:t>changeTires</a:t>
+            </a:r>
+            <a:r>
+              <a:rPr lang="en-US" dirty="0" smtClean="0"/>
+              <a:t> itself?</a:t>
+            </a:r>
+          </a:p>
+          <a:p>
+            <a:pPr lvl="2"/>
+            <a:r>
+              <a:rPr lang="en-US" dirty="0" smtClean="0"/>
+              <a:t>If it is no, it is violating SRP.</a:t>
+            </a:r>
+          </a:p>
+          <a:p>
+            <a:endParaRPr lang="en-US" dirty="0"/>
+          </a:p>
+        </p:txBody>
+      </p:sp>
+      <p:sp>
+        <p:nvSpPr>
+          <p:cNvPr id="4" name="Slide Number Placeholder 3"/>
+          <p:cNvSpPr>
+            <a:spLocks noGrp="1"/>
+          </p:cNvSpPr>
+          <p:nvPr>
+            <p:ph type="sldNum" sz="quarter" idx="10"/>
+          </p:nvPr>
+        </p:nvSpPr>
+        <p:spPr/>
+        <p:txBody>
+          <a:bodyPr/>
+          <a:lstStyle/>
+          <a:p>
+            <a:fld id="{D73FF19C-8393-2A49-92A3-90AE761DDBC5}" type="slidenum">
+              <a:rPr lang="en-US" smtClean="0"/>
+              <a:t>47</a:t>
+            </a:fld>
+            <a:endParaRPr lang="en-US" dirty="0"/>
+          </a:p>
+        </p:txBody>
+      </p:sp>
+    </p:spTree>
+    <p:extLst>
+      <p:ext uri="{BB962C8B-B14F-4D97-AF65-F5344CB8AC3E}">
+        <p14:creationId xmlns:p14="http://schemas.microsoft.com/office/powerpoint/2010/main" val="891337501"/>
+      </p:ext>
+    </p:extLst>
+  </p:cSld>
+  <p:clrMapOvr>
+    <a:masterClrMapping/>
+  </p:clrMapOvr>
+</p:notes>
+</file>
+
+<file path=ppt/notesSlides/notesSlide35.xml><?xml version="1.0" encoding="utf-8"?>
+<p:notes xmlns:a="http://schemas.openxmlformats.org/drawingml/2006/main" xmlns:r="http://schemas.openxmlformats.org/officeDocument/2006/relationships" xmlns:p="http://schemas.openxmlformats.org/presentationml/2006/main">
+  <p:cSld>
+    <p:spTree>
+      <p:nvGrpSpPr>
+        <p:cNvPr id="1" name=""/>
+        <p:cNvGrpSpPr/>
+        <p:nvPr/>
+      </p:nvGrpSpPr>
+      <p:grpSpPr>
+        <a:xfrm>
+          <a:off x="0" y="0"/>
+          <a:ext cx="0" cy="0"/>
+          <a:chOff x="0" y="0"/>
+          <a:chExt cx="0" cy="0"/>
+        </a:xfrm>
+      </p:grpSpPr>
+      <p:sp>
+        <p:nvSpPr>
+          <p:cNvPr id="2" name="Slide Image Placeholder 1"/>
+          <p:cNvSpPr>
+            <a:spLocks noGrp="1" noRot="1" noChangeAspect="1"/>
+          </p:cNvSpPr>
+          <p:nvPr>
+            <p:ph type="sldImg"/>
+          </p:nvPr>
+        </p:nvSpPr>
+        <p:spPr/>
+      </p:sp>
+      <p:sp>
+        <p:nvSpPr>
+          <p:cNvPr id="3" name="Notes Placeholder 2"/>
+          <p:cNvSpPr>
+            <a:spLocks noGrp="1"/>
+          </p:cNvSpPr>
+          <p:nvPr>
+            <p:ph type="body" idx="1"/>
+          </p:nvPr>
+        </p:nvSpPr>
+        <p:spPr/>
+        <p:txBody>
+          <a:bodyPr/>
+          <a:lstStyle/>
+          <a:p>
+            <a:pPr marL="0" marR="0" lvl="0" indent="0" algn="l" defTabSz="457200" rtl="0" eaLnBrk="1" fontAlgn="auto" latinLnBrk="0" hangingPunct="1">
+              <a:lnSpc>
+                <a:spcPct val="100000"/>
+              </a:lnSpc>
+              <a:spcBef>
+                <a:spcPts val="0"/>
+              </a:spcBef>
+              <a:spcAft>
+                <a:spcPts val="0"/>
+              </a:spcAft>
+              <a:buClrTx/>
+              <a:buSzTx/>
+              <a:buFontTx/>
+              <a:buNone/>
+              <a:tabLst/>
+              <a:defRPr/>
+            </a:pPr>
+            <a:r>
               <a:rPr lang="en-US" dirty="0" smtClean="0">
                 <a:solidFill>
                   <a:srgbClr val="FF0000"/>
@@ -3398,7 +4022,7 @@
 </p:notes>
 </file>
 
-<file path=ppt/notesSlides/notesSlide31.xml><?xml version="1.0" encoding="utf-8"?>
+<file path=ppt/notesSlides/notesSlide36.xml><?xml version="1.0" encoding="utf-8"?>
 <p:notes xmlns:a="http://schemas.openxmlformats.org/drawingml/2006/main" xmlns:r="http://schemas.openxmlformats.org/officeDocument/2006/relationships" xmlns:p="http://schemas.openxmlformats.org/presentationml/2006/main">
   <p:cSld>
     <p:spTree>
@@ -3927,7 +4551,20 @@
             </a:r>
             <a:r>
               <a:rPr lang="en-US" baseline="0" dirty="0" smtClean="0"/>
-              <a:t> should be smarter than that. [CLICK]</a:t>
+              <a:t> should be smarter than that. [CLICK</a:t>
+            </a:r>
+            <a:r>
+              <a:rPr lang="en-US" baseline="0" dirty="0" smtClean="0"/>
+              <a:t>]</a:t>
+            </a:r>
+          </a:p>
+          <a:p>
+            <a:endParaRPr lang="en-US" baseline="0" dirty="0" smtClean="0"/>
+          </a:p>
+          <a:p>
+            <a:r>
+              <a:rPr lang="en-US" baseline="0" dirty="0" smtClean="0"/>
+              <a:t>And maybe one can do go one step further and do this in a loop</a:t>
             </a:r>
             <a:endParaRPr lang="en-US" dirty="0"/>
           </a:p>
@@ -4019,8 +4656,13 @@
             </a:r>
             <a:r>
               <a:rPr lang="en-US" baseline="0" dirty="0" smtClean="0"/>
-              <a:t> also want to write the dog’s name.</a:t>
-            </a:r>
+              <a:t> also want to write the dog’s name</a:t>
+            </a:r>
+            <a:r>
+              <a:rPr lang="en-US" baseline="0" dirty="0" smtClean="0"/>
+              <a:t>. [CLICK]</a:t>
+            </a:r>
+            <a:endParaRPr lang="en-US" baseline="0" dirty="0" smtClean="0"/>
           </a:p>
           <a:p>
             <a:endParaRPr lang="en-US" baseline="0" dirty="0" smtClean="0"/>
@@ -4036,7 +4678,11 @@
             </a:r>
             <a:r>
               <a:rPr lang="en-US" baseline="0" dirty="0" smtClean="0"/>
-              <a:t>, so here it is.</a:t>
+              <a:t>, so here it is</a:t>
+            </a:r>
+            <a:r>
+              <a:rPr lang="en-US" baseline="0" dirty="0" smtClean="0"/>
+              <a:t>. [CLICK]</a:t>
             </a:r>
             <a:endParaRPr lang="en-US" dirty="0"/>
           </a:p>
@@ -8212,15 +8858,7 @@
           <a:p>
             <a:r>
               <a:rPr lang="en-US" dirty="0" smtClean="0"/>
-              <a:t>Modularizing – </a:t>
-            </a:r>
-            <a:r>
-              <a:rPr lang="en-US" dirty="0" smtClean="0"/>
-              <a:t>more </a:t>
-            </a:r>
-            <a:r>
-              <a:rPr lang="en-US" dirty="0" smtClean="0"/>
-              <a:t>parametrized</a:t>
+              <a:t>Modularizing – more parametrized</a:t>
             </a:r>
             <a:endParaRPr lang="en-US" dirty="0"/>
           </a:p>
@@ -10952,7 +11590,7 @@
           <p:nvPr/>
         </p:nvPicPr>
         <p:blipFill>
-          <a:blip r:embed="rId2">
+          <a:blip r:embed="rId3">
             <a:extLst>
               <a:ext uri="{28A0092B-C50C-407E-A947-70E740481C1C}">
                 <a14:useLocalDpi xmlns:a14="http://schemas.microsoft.com/office/drawing/2010/main" val="0"/>
@@ -10993,7 +11631,7 @@
           <p:nvPr/>
         </p:nvPicPr>
         <p:blipFill>
-          <a:blip r:embed="rId3"/>
+          <a:blip r:embed="rId4"/>
           <a:stretch>
             <a:fillRect/>
           </a:stretch>
@@ -11412,11 +12050,7 @@
           <a:p>
             <a:r>
               <a:rPr lang="en-US" dirty="0" smtClean="0"/>
-              <a:t>Programming </a:t>
-            </a:r>
-            <a:r>
-              <a:rPr lang="en-US" dirty="0" smtClean="0"/>
-              <a:t>languages</a:t>
+              <a:t>Programming languages</a:t>
             </a:r>
             <a:endParaRPr lang="en-US" dirty="0"/>
           </a:p>
@@ -11646,7 +12280,7 @@
           </p:nvPr>
         </p:nvPicPr>
         <p:blipFill>
-          <a:blip r:embed="rId2">
+          <a:blip r:embed="rId3">
             <a:extLst>
               <a:ext uri="{28A0092B-C50C-407E-A947-70E740481C1C}">
                 <a14:useLocalDpi xmlns:a14="http://schemas.microsoft.com/office/drawing/2010/main" val="0"/>
@@ -11846,11 +12480,7 @@
           <a:p>
             <a:r>
               <a:rPr lang="en-US" dirty="0" smtClean="0"/>
-              <a:t>UML </a:t>
-            </a:r>
-            <a:r>
-              <a:rPr lang="en-US" dirty="0" smtClean="0"/>
-              <a:t>basics</a:t>
+              <a:t>UML basics</a:t>
             </a:r>
             <a:endParaRPr lang="en-US" dirty="0"/>
           </a:p>
@@ -12824,7 +13454,7 @@
           <p:nvPr/>
         </p:nvPicPr>
         <p:blipFill>
-          <a:blip r:embed="rId2"/>
+          <a:blip r:embed="rId3"/>
           <a:stretch>
             <a:fillRect/>
           </a:stretch>
@@ -12911,7 +13541,7 @@
           <p:nvPr/>
         </p:nvPicPr>
         <p:blipFill>
-          <a:blip r:embed="rId3"/>
+          <a:blip r:embed="rId4"/>
           <a:stretch>
             <a:fillRect/>
           </a:stretch>
@@ -13798,11 +14428,7 @@
             <a:pPr algn="l"/>
             <a:r>
               <a:rPr lang="en-US" dirty="0" smtClean="0"/>
-              <a:t>Now</a:t>
-            </a:r>
-            <a:r>
-              <a:rPr lang="en-US" dirty="0" smtClean="0"/>
-              <a:t>, we can create objects</a:t>
+              <a:t>Now, we can create objects</a:t>
             </a:r>
           </a:p>
           <a:p>
@@ -13875,7 +14501,7 @@
           <p:nvPr/>
         </p:nvPicPr>
         <p:blipFill>
-          <a:blip r:embed="rId2"/>
+          <a:blip r:embed="rId3"/>
           <a:stretch>
             <a:fillRect/>
           </a:stretch>
@@ -13947,7 +14573,7 @@
           <p:nvPr/>
         </p:nvPicPr>
         <p:blipFill>
-          <a:blip r:embed="rId3"/>
+          <a:blip r:embed="rId4"/>
           <a:stretch>
             <a:fillRect/>
           </a:stretch>
@@ -13971,7 +14597,7 @@
           <p:nvPr/>
         </p:nvPicPr>
         <p:blipFill>
-          <a:blip r:embed="rId4"/>
+          <a:blip r:embed="rId5"/>
           <a:stretch>
             <a:fillRect/>
           </a:stretch>
@@ -14646,11 +15272,7 @@
             <a:pPr lvl="1" algn="l"/>
             <a:r>
               <a:rPr lang="en-US" dirty="0" smtClean="0"/>
-              <a:t>Single </a:t>
-            </a:r>
-            <a:r>
-              <a:rPr lang="en-US" dirty="0" smtClean="0"/>
-              <a:t>Responsibility principle</a:t>
+              <a:t>Single Responsibility principle</a:t>
             </a:r>
           </a:p>
           <a:p>
@@ -15179,11 +15801,7 @@
           <a:p>
             <a:r>
               <a:rPr lang="en-US" dirty="0" smtClean="0"/>
-              <a:t>A </a:t>
-            </a:r>
-            <a:r>
-              <a:rPr lang="en-US" dirty="0" smtClean="0"/>
-              <a:t>non-complex </a:t>
+              <a:t>A non-complex </a:t>
             </a:r>
             <a:r>
               <a:rPr lang="en-US" dirty="0"/>
@@ -32683,11 +33301,7 @@
           <a:p>
             <a:r>
               <a:rPr lang="en-US" dirty="0" smtClean="0"/>
-              <a:t>Modularizing - </a:t>
-            </a:r>
-            <a:r>
-              <a:rPr lang="en-US" dirty="0" smtClean="0"/>
-              <a:t>parametrized</a:t>
+              <a:t>Modularizing - parametrized</a:t>
             </a:r>
             <a:endParaRPr lang="en-US" dirty="0"/>
           </a:p>

</xml_diff>